<commit_message>
/TODO: Construct Guest part to canceling
</commit_message>
<xml_diff>
--- a/admin.pptx
+++ b/admin.pptx
@@ -6,8 +6,10 @@
   </p:sldMasterIdLst>
   <p:sldIdLst>
     <p:sldId id="256" r:id="rId2"/>
-    <p:sldId id="257" r:id="rId3"/>
-    <p:sldId id="258" r:id="rId4"/>
+    <p:sldId id="259" r:id="rId3"/>
+    <p:sldId id="257" r:id="rId4"/>
+    <p:sldId id="258" r:id="rId5"/>
+    <p:sldId id="260" r:id="rId6"/>
   </p:sldIdLst>
   <p:sldSz cx="12192000" cy="6858000"/>
   <p:notesSz cx="6858000" cy="9144000"/>
@@ -261,7 +263,7 @@
           <a:p>
             <a:fld id="{287758F7-F71D-4B6C-BA56-457940CB7DDC}" type="datetimeFigureOut">
               <a:rPr lang="ko-KR" altLang="en-US" smtClean="0"/>
-              <a:t>2021-04-30</a:t>
+              <a:t>2021-05-01</a:t>
             </a:fld>
             <a:endParaRPr lang="ko-KR" altLang="en-US"/>
           </a:p>
@@ -459,7 +461,7 @@
           <a:p>
             <a:fld id="{287758F7-F71D-4B6C-BA56-457940CB7DDC}" type="datetimeFigureOut">
               <a:rPr lang="ko-KR" altLang="en-US" smtClean="0"/>
-              <a:t>2021-04-30</a:t>
+              <a:t>2021-05-01</a:t>
             </a:fld>
             <a:endParaRPr lang="ko-KR" altLang="en-US"/>
           </a:p>
@@ -667,7 +669,7 @@
           <a:p>
             <a:fld id="{287758F7-F71D-4B6C-BA56-457940CB7DDC}" type="datetimeFigureOut">
               <a:rPr lang="ko-KR" altLang="en-US" smtClean="0"/>
-              <a:t>2021-04-30</a:t>
+              <a:t>2021-05-01</a:t>
             </a:fld>
             <a:endParaRPr lang="ko-KR" altLang="en-US"/>
           </a:p>
@@ -865,7 +867,7 @@
           <a:p>
             <a:fld id="{287758F7-F71D-4B6C-BA56-457940CB7DDC}" type="datetimeFigureOut">
               <a:rPr lang="ko-KR" altLang="en-US" smtClean="0"/>
-              <a:t>2021-04-30</a:t>
+              <a:t>2021-05-01</a:t>
             </a:fld>
             <a:endParaRPr lang="ko-KR" altLang="en-US"/>
           </a:p>
@@ -1140,7 +1142,7 @@
           <a:p>
             <a:fld id="{287758F7-F71D-4B6C-BA56-457940CB7DDC}" type="datetimeFigureOut">
               <a:rPr lang="ko-KR" altLang="en-US" smtClean="0"/>
-              <a:t>2021-04-30</a:t>
+              <a:t>2021-05-01</a:t>
             </a:fld>
             <a:endParaRPr lang="ko-KR" altLang="en-US"/>
           </a:p>
@@ -1405,7 +1407,7 @@
           <a:p>
             <a:fld id="{287758F7-F71D-4B6C-BA56-457940CB7DDC}" type="datetimeFigureOut">
               <a:rPr lang="ko-KR" altLang="en-US" smtClean="0"/>
-              <a:t>2021-04-30</a:t>
+              <a:t>2021-05-01</a:t>
             </a:fld>
             <a:endParaRPr lang="ko-KR" altLang="en-US"/>
           </a:p>
@@ -1817,7 +1819,7 @@
           <a:p>
             <a:fld id="{287758F7-F71D-4B6C-BA56-457940CB7DDC}" type="datetimeFigureOut">
               <a:rPr lang="ko-KR" altLang="en-US" smtClean="0"/>
-              <a:t>2021-04-30</a:t>
+              <a:t>2021-05-01</a:t>
             </a:fld>
             <a:endParaRPr lang="ko-KR" altLang="en-US"/>
           </a:p>
@@ -1958,7 +1960,7 @@
           <a:p>
             <a:fld id="{287758F7-F71D-4B6C-BA56-457940CB7DDC}" type="datetimeFigureOut">
               <a:rPr lang="ko-KR" altLang="en-US" smtClean="0"/>
-              <a:t>2021-04-30</a:t>
+              <a:t>2021-05-01</a:t>
             </a:fld>
             <a:endParaRPr lang="ko-KR" altLang="en-US"/>
           </a:p>
@@ -2071,7 +2073,7 @@
           <a:p>
             <a:fld id="{287758F7-F71D-4B6C-BA56-457940CB7DDC}" type="datetimeFigureOut">
               <a:rPr lang="ko-KR" altLang="en-US" smtClean="0"/>
-              <a:t>2021-04-30</a:t>
+              <a:t>2021-05-01</a:t>
             </a:fld>
             <a:endParaRPr lang="ko-KR" altLang="en-US"/>
           </a:p>
@@ -2382,7 +2384,7 @@
           <a:p>
             <a:fld id="{287758F7-F71D-4B6C-BA56-457940CB7DDC}" type="datetimeFigureOut">
               <a:rPr lang="ko-KR" altLang="en-US" smtClean="0"/>
-              <a:t>2021-04-30</a:t>
+              <a:t>2021-05-01</a:t>
             </a:fld>
             <a:endParaRPr lang="ko-KR" altLang="en-US"/>
           </a:p>
@@ -2670,7 +2672,7 @@
           <a:p>
             <a:fld id="{287758F7-F71D-4B6C-BA56-457940CB7DDC}" type="datetimeFigureOut">
               <a:rPr lang="ko-KR" altLang="en-US" smtClean="0"/>
-              <a:t>2021-04-30</a:t>
+              <a:t>2021-05-01</a:t>
             </a:fld>
             <a:endParaRPr lang="ko-KR" altLang="en-US"/>
           </a:p>
@@ -2911,7 +2913,7 @@
           <a:p>
             <a:fld id="{287758F7-F71D-4B6C-BA56-457940CB7DDC}" type="datetimeFigureOut">
               <a:rPr lang="ko-KR" altLang="en-US" smtClean="0"/>
-              <a:t>2021-04-30</a:t>
+              <a:t>2021-05-01</a:t>
             </a:fld>
             <a:endParaRPr lang="ko-KR" altLang="en-US"/>
           </a:p>
@@ -3519,7 +3521,7 @@
           <p:cNvPr id="4" name="TextBox 3">
             <a:extLst>
               <a:ext uri="{FF2B5EF4-FFF2-40B4-BE49-F238E27FC236}">
-                <a16:creationId xmlns:a16="http://schemas.microsoft.com/office/drawing/2014/main" id="{8AD256F3-6B1F-41D6-A701-F05B5A7F13DA}"/>
+                <a16:creationId xmlns:a16="http://schemas.microsoft.com/office/drawing/2014/main" id="{BB45596C-A499-4268-BC1D-92031AD9C24F}"/>
               </a:ext>
             </a:extLst>
           </p:cNvPr>
@@ -3528,8 +3530,8 @@
         </p:nvSpPr>
         <p:spPr>
           <a:xfrm>
-            <a:off x="5865448" y="1106239"/>
-            <a:ext cx="1609928" cy="1754326"/>
+            <a:off x="1447800" y="1727200"/>
+            <a:ext cx="1986441" cy="369332"/>
           </a:xfrm>
           <a:prstGeom prst="rect">
             <a:avLst/>
@@ -3543,391 +3545,20 @@
           <a:lstStyle/>
           <a:p>
             <a:r>
-              <a:rPr lang="en-US" altLang="ko-KR" sz="2800" dirty="0"/>
-              <a:t>Admin</a:t>
-            </a:r>
-          </a:p>
-          <a:p>
-            <a:pPr marL="285750" indent="-285750">
-              <a:buFont typeface="Arial" panose="020B0604020202020204" pitchFamily="34" charset="0"/>
-              <a:buChar char="•"/>
-            </a:pPr>
-            <a:r>
-              <a:rPr lang="en-US" altLang="ko-KR" sz="1600" dirty="0" err="1"/>
-              <a:t>Check_In</a:t>
-            </a:r>
-            <a:endParaRPr lang="en-US" altLang="ko-KR" sz="1600" dirty="0"/>
-          </a:p>
-          <a:p>
-            <a:pPr marL="285750" indent="-285750">
-              <a:buFont typeface="Arial" panose="020B0604020202020204" pitchFamily="34" charset="0"/>
-              <a:buChar char="•"/>
-            </a:pPr>
-            <a:r>
-              <a:rPr lang="en-US" altLang="ko-KR" sz="1600" dirty="0" err="1"/>
-              <a:t>Check_Out</a:t>
-            </a:r>
-            <a:endParaRPr lang="en-US" altLang="ko-KR" sz="1600" dirty="0"/>
-          </a:p>
-          <a:p>
-            <a:pPr marL="285750" indent="-285750">
-              <a:buFont typeface="Arial" panose="020B0604020202020204" pitchFamily="34" charset="0"/>
-              <a:buChar char="•"/>
-            </a:pPr>
-            <a:r>
-              <a:rPr lang="en-US" altLang="ko-KR" sz="1600" dirty="0"/>
-              <a:t>List</a:t>
-            </a:r>
-          </a:p>
-          <a:p>
-            <a:pPr marL="285750" indent="-285750">
-              <a:buFont typeface="Arial" panose="020B0604020202020204" pitchFamily="34" charset="0"/>
-              <a:buChar char="•"/>
-            </a:pPr>
-            <a:r>
-              <a:rPr lang="en-US" altLang="ko-KR" sz="1600" dirty="0"/>
-              <a:t>Update</a:t>
-            </a:r>
-          </a:p>
-          <a:p>
-            <a:pPr marL="285750" indent="-285750">
-              <a:buFont typeface="Arial" panose="020B0604020202020204" pitchFamily="34" charset="0"/>
-              <a:buChar char="•"/>
-            </a:pPr>
-            <a:r>
-              <a:rPr lang="en-US" altLang="ko-KR" sz="1600" dirty="0" err="1"/>
-              <a:t>Request_List</a:t>
-            </a:r>
-            <a:endParaRPr lang="ko-KR" altLang="en-US" sz="1600" dirty="0"/>
-          </a:p>
-        </p:txBody>
-      </p:sp>
-      <p:sp>
-        <p:nvSpPr>
-          <p:cNvPr id="5" name="TextBox 4">
-            <a:extLst>
-              <a:ext uri="{FF2B5EF4-FFF2-40B4-BE49-F238E27FC236}">
-                <a16:creationId xmlns:a16="http://schemas.microsoft.com/office/drawing/2014/main" id="{5E896B6E-0963-43E8-B00E-BF65424AB172}"/>
-              </a:ext>
-            </a:extLst>
-          </p:cNvPr>
-          <p:cNvSpPr txBox="1"/>
-          <p:nvPr/>
-        </p:nvSpPr>
-        <p:spPr>
-          <a:xfrm>
-            <a:off x="1228921" y="1466325"/>
-            <a:ext cx="2214389" cy="1015663"/>
-          </a:xfrm>
-          <a:prstGeom prst="rect">
-            <a:avLst/>
-          </a:prstGeom>
-          <a:noFill/>
-        </p:spPr>
-        <p:txBody>
-          <a:bodyPr wrap="none" rtlCol="0">
-            <a:spAutoFit/>
-          </a:bodyPr>
-          <a:lstStyle/>
-          <a:p>
-            <a:r>
-              <a:rPr lang="en-US" altLang="ko-KR" sz="2800" dirty="0"/>
-              <a:t>Guest</a:t>
-            </a:r>
-          </a:p>
-          <a:p>
-            <a:pPr marL="285750" indent="-285750">
-              <a:buFont typeface="Arial" panose="020B0604020202020204" pitchFamily="34" charset="0"/>
-              <a:buChar char="•"/>
-            </a:pPr>
-            <a:r>
-              <a:rPr lang="en-US" altLang="ko-KR" sz="1600" dirty="0" err="1"/>
-              <a:t>Check_in_request</a:t>
-            </a:r>
-            <a:endParaRPr lang="en-US" altLang="ko-KR" sz="1600" dirty="0"/>
-          </a:p>
-          <a:p>
-            <a:pPr marL="285750" indent="-285750">
-              <a:buFont typeface="Arial" panose="020B0604020202020204" pitchFamily="34" charset="0"/>
-              <a:buChar char="•"/>
-            </a:pPr>
-            <a:r>
-              <a:rPr lang="en-US" altLang="ko-KR" sz="1600" dirty="0" err="1"/>
-              <a:t>Check_out_request</a:t>
-            </a:r>
-            <a:endParaRPr lang="en-US" altLang="ko-KR" sz="1600" dirty="0"/>
-          </a:p>
-        </p:txBody>
-      </p:sp>
-      <p:cxnSp>
-        <p:nvCxnSpPr>
-          <p:cNvPr id="7" name="직선 화살표 연결선 6">
-            <a:extLst>
-              <a:ext uri="{FF2B5EF4-FFF2-40B4-BE49-F238E27FC236}">
-                <a16:creationId xmlns:a16="http://schemas.microsoft.com/office/drawing/2014/main" id="{AC07FDE2-34D3-4A71-88B4-14FA2F14BA99}"/>
-              </a:ext>
-            </a:extLst>
-          </p:cNvPr>
-          <p:cNvCxnSpPr>
-            <a:cxnSpLocks/>
-            <a:stCxn id="5" idx="3"/>
-            <a:endCxn id="4" idx="1"/>
-          </p:cNvCxnSpPr>
-          <p:nvPr/>
-        </p:nvCxnSpPr>
-        <p:spPr>
-          <a:xfrm>
-            <a:off x="3443310" y="1974157"/>
-            <a:ext cx="2422138" cy="9245"/>
-          </a:xfrm>
-          <a:prstGeom prst="straightConnector1">
-            <a:avLst/>
-          </a:prstGeom>
-          <a:ln>
-            <a:tailEnd type="triangle"/>
-          </a:ln>
-        </p:spPr>
-        <p:style>
-          <a:lnRef idx="1">
-            <a:schemeClr val="accent1"/>
-          </a:lnRef>
-          <a:fillRef idx="0">
-            <a:schemeClr val="accent1"/>
-          </a:fillRef>
-          <a:effectRef idx="0">
-            <a:schemeClr val="accent1"/>
-          </a:effectRef>
-          <a:fontRef idx="minor">
-            <a:schemeClr val="tx1"/>
-          </a:fontRef>
-        </p:style>
-      </p:cxnSp>
-      <p:sp>
-        <p:nvSpPr>
-          <p:cNvPr id="8" name="TextBox 7">
-            <a:extLst>
-              <a:ext uri="{FF2B5EF4-FFF2-40B4-BE49-F238E27FC236}">
-                <a16:creationId xmlns:a16="http://schemas.microsoft.com/office/drawing/2014/main" id="{7B1E0096-1D3C-4966-B30A-0D303A3C745C}"/>
-              </a:ext>
-            </a:extLst>
-          </p:cNvPr>
-          <p:cNvSpPr txBox="1"/>
-          <p:nvPr/>
-        </p:nvSpPr>
-        <p:spPr>
-          <a:xfrm>
-            <a:off x="4247123" y="1767192"/>
-            <a:ext cx="742511" cy="246221"/>
-          </a:xfrm>
-          <a:prstGeom prst="rect">
-            <a:avLst/>
-          </a:prstGeom>
-          <a:noFill/>
-        </p:spPr>
-        <p:txBody>
-          <a:bodyPr wrap="none" rtlCol="0">
-            <a:spAutoFit/>
-          </a:bodyPr>
-          <a:lstStyle/>
-          <a:p>
-            <a:r>
-              <a:rPr lang="ko-KR" altLang="en-US" sz="1000" dirty="0"/>
-              <a:t>정보 전송</a:t>
-            </a:r>
-          </a:p>
-        </p:txBody>
-      </p:sp>
-      <p:sp>
-        <p:nvSpPr>
-          <p:cNvPr id="12" name="TextBox 11">
-            <a:extLst>
-              <a:ext uri="{FF2B5EF4-FFF2-40B4-BE49-F238E27FC236}">
-                <a16:creationId xmlns:a16="http://schemas.microsoft.com/office/drawing/2014/main" id="{CF4F6193-448C-4E7D-BA6F-2530D213803C}"/>
-              </a:ext>
-            </a:extLst>
-          </p:cNvPr>
-          <p:cNvSpPr txBox="1"/>
-          <p:nvPr/>
-        </p:nvSpPr>
-        <p:spPr>
-          <a:xfrm>
-            <a:off x="6880137" y="3661067"/>
-            <a:ext cx="1041439" cy="538609"/>
-          </a:xfrm>
-          <a:prstGeom prst="rect">
-            <a:avLst/>
-          </a:prstGeom>
-          <a:noFill/>
-        </p:spPr>
-        <p:txBody>
-          <a:bodyPr wrap="none" rtlCol="0">
-            <a:spAutoFit/>
-          </a:bodyPr>
-          <a:lstStyle/>
-          <a:p>
-            <a:r>
               <a:rPr lang="en-US" altLang="ko-KR" dirty="0"/>
-              <a:t>+ Room</a:t>
-            </a:r>
-          </a:p>
-          <a:p>
-            <a:pPr marL="171450" indent="-171450">
-              <a:buFont typeface="Arial" panose="020B0604020202020204" pitchFamily="34" charset="0"/>
-              <a:buChar char="•"/>
-            </a:pPr>
-            <a:r>
-              <a:rPr lang="en-US" altLang="ko-KR" sz="1100" dirty="0"/>
-              <a:t>Info</a:t>
-            </a:r>
-          </a:p>
-        </p:txBody>
-      </p:sp>
-      <p:cxnSp>
-        <p:nvCxnSpPr>
-          <p:cNvPr id="14" name="직선 화살표 연결선 13">
-            <a:extLst>
-              <a:ext uri="{FF2B5EF4-FFF2-40B4-BE49-F238E27FC236}">
-                <a16:creationId xmlns:a16="http://schemas.microsoft.com/office/drawing/2014/main" id="{B85DDA31-CF43-4AD1-9609-26CC72596787}"/>
-              </a:ext>
-            </a:extLst>
-          </p:cNvPr>
-          <p:cNvCxnSpPr>
-            <a:stCxn id="12" idx="1"/>
-            <a:endCxn id="4" idx="2"/>
-          </p:cNvCxnSpPr>
-          <p:nvPr/>
-        </p:nvCxnSpPr>
-        <p:spPr>
-          <a:xfrm flipH="1" flipV="1">
-            <a:off x="6670412" y="2860565"/>
-            <a:ext cx="209725" cy="1069807"/>
-          </a:xfrm>
-          <a:prstGeom prst="straightConnector1">
-            <a:avLst/>
-          </a:prstGeom>
-          <a:ln>
-            <a:tailEnd type="triangle"/>
-          </a:ln>
-        </p:spPr>
-        <p:style>
-          <a:lnRef idx="1">
-            <a:schemeClr val="accent1"/>
-          </a:lnRef>
-          <a:fillRef idx="0">
-            <a:schemeClr val="accent1"/>
-          </a:fillRef>
-          <a:effectRef idx="0">
-            <a:schemeClr val="accent1"/>
-          </a:effectRef>
-          <a:fontRef idx="minor">
-            <a:schemeClr val="tx1"/>
-          </a:fontRef>
-        </p:style>
-      </p:cxnSp>
-      <p:sp>
-        <p:nvSpPr>
-          <p:cNvPr id="16" name="TextBox 15">
-            <a:extLst>
-              <a:ext uri="{FF2B5EF4-FFF2-40B4-BE49-F238E27FC236}">
-                <a16:creationId xmlns:a16="http://schemas.microsoft.com/office/drawing/2014/main" id="{40E71153-4448-4FC3-B470-5C40376CC098}"/>
-              </a:ext>
-            </a:extLst>
-          </p:cNvPr>
-          <p:cNvSpPr txBox="1"/>
-          <p:nvPr/>
-        </p:nvSpPr>
-        <p:spPr>
-          <a:xfrm>
-            <a:off x="1117372" y="4431095"/>
-            <a:ext cx="2811988" cy="877163"/>
-          </a:xfrm>
-          <a:prstGeom prst="rect">
-            <a:avLst/>
-          </a:prstGeom>
-          <a:noFill/>
-        </p:spPr>
-        <p:txBody>
-          <a:bodyPr wrap="none" rtlCol="0">
-            <a:spAutoFit/>
-          </a:bodyPr>
-          <a:lstStyle/>
-          <a:p>
-            <a:r>
-              <a:rPr lang="en-US" altLang="ko-KR" dirty="0"/>
-              <a:t>How request??</a:t>
-            </a:r>
-          </a:p>
-          <a:p>
-            <a:r>
-              <a:rPr lang="en-US" altLang="ko-KR" sz="1100" dirty="0"/>
-              <a:t>&gt;&gt; save to </a:t>
-            </a:r>
-            <a:r>
-              <a:rPr lang="en-US" altLang="ko-KR" sz="1100" dirty="0" err="1"/>
-              <a:t>AdminController.Request_List</a:t>
-            </a:r>
-            <a:endParaRPr lang="en-US" altLang="ko-KR" sz="1100" dirty="0"/>
-          </a:p>
-          <a:p>
-            <a:endParaRPr lang="en-US" altLang="ko-KR" sz="1100" dirty="0"/>
-          </a:p>
-          <a:p>
-            <a:r>
-              <a:rPr lang="en-US" altLang="ko-KR" sz="1100" dirty="0"/>
-              <a:t>&gt;&gt; </a:t>
-            </a:r>
-            <a:r>
-              <a:rPr lang="en-US" altLang="ko-KR" sz="1100" dirty="0" err="1"/>
-              <a:t>websocket</a:t>
-            </a:r>
-            <a:r>
-              <a:rPr lang="en-US" altLang="ko-KR" sz="1100" dirty="0"/>
-              <a:t> make sound</a:t>
-            </a:r>
-            <a:endParaRPr lang="ko-KR" altLang="en-US" sz="1100" dirty="0"/>
-          </a:p>
-        </p:txBody>
-      </p:sp>
-      <p:sp>
-        <p:nvSpPr>
-          <p:cNvPr id="2" name="TextBox 1">
-            <a:extLst>
-              <a:ext uri="{FF2B5EF4-FFF2-40B4-BE49-F238E27FC236}">
-                <a16:creationId xmlns:a16="http://schemas.microsoft.com/office/drawing/2014/main" id="{749FA2F1-276D-4138-9D77-D7A2D2CAEFDA}"/>
-              </a:ext>
-            </a:extLst>
-          </p:cNvPr>
-          <p:cNvSpPr txBox="1"/>
-          <p:nvPr/>
-        </p:nvSpPr>
-        <p:spPr>
-          <a:xfrm>
-            <a:off x="495300" y="495300"/>
-            <a:ext cx="1562094" cy="461665"/>
-          </a:xfrm>
-          <a:prstGeom prst="rect">
-            <a:avLst/>
-          </a:prstGeom>
-          <a:noFill/>
-        </p:spPr>
-        <p:txBody>
-          <a:bodyPr wrap="none" rtlCol="0">
-            <a:spAutoFit/>
-          </a:bodyPr>
-          <a:lstStyle/>
-          <a:p>
-            <a:r>
-              <a:rPr lang="en-US" altLang="ko-KR" sz="2400" dirty="0"/>
-              <a:t>Controller</a:t>
-            </a:r>
-            <a:endParaRPr lang="ko-KR" altLang="en-US" sz="2400" dirty="0"/>
+              <a:t>UML </a:t>
+            </a:r>
+            <a:r>
+              <a:rPr lang="ko-KR" altLang="en-US" dirty="0"/>
+              <a:t>이미지 추가</a:t>
+            </a:r>
           </a:p>
         </p:txBody>
       </p:sp>
     </p:spTree>
     <p:extLst>
       <p:ext uri="{BB962C8B-B14F-4D97-AF65-F5344CB8AC3E}">
-        <p14:creationId xmlns:p14="http://schemas.microsoft.com/office/powerpoint/2010/main" val="3420516148"/>
+        <p14:creationId xmlns:p14="http://schemas.microsoft.com/office/powerpoint/2010/main" val="3944094545"/>
       </p:ext>
     </p:extLst>
   </p:cSld>
@@ -3954,10 +3585,805 @@
           <a:chExt cx="0" cy="0"/>
         </a:xfrm>
       </p:grpSpPr>
+      <p:sp>
+        <p:nvSpPr>
+          <p:cNvPr id="4" name="TextBox 3">
+            <a:extLst>
+              <a:ext uri="{FF2B5EF4-FFF2-40B4-BE49-F238E27FC236}">
+                <a16:creationId xmlns:a16="http://schemas.microsoft.com/office/drawing/2014/main" id="{8AD256F3-6B1F-41D6-A701-F05B5A7F13DA}"/>
+              </a:ext>
+            </a:extLst>
+          </p:cNvPr>
+          <p:cNvSpPr txBox="1"/>
+          <p:nvPr/>
+        </p:nvSpPr>
+        <p:spPr>
+          <a:xfrm>
+            <a:off x="5954348" y="1207839"/>
+            <a:ext cx="1470274" cy="1508105"/>
+          </a:xfrm>
+          <a:prstGeom prst="rect">
+            <a:avLst/>
+          </a:prstGeom>
+          <a:noFill/>
+        </p:spPr>
+        <p:txBody>
+          <a:bodyPr wrap="none" rtlCol="0">
+            <a:spAutoFit/>
+          </a:bodyPr>
+          <a:lstStyle/>
+          <a:p>
+            <a:r>
+              <a:rPr lang="en-US" altLang="ko-KR" sz="2800" dirty="0"/>
+              <a:t>Admin</a:t>
+            </a:r>
+          </a:p>
+          <a:p>
+            <a:pPr marL="285750" indent="-285750">
+              <a:buFont typeface="Arial" panose="020B0604020202020204" pitchFamily="34" charset="0"/>
+              <a:buChar char="•"/>
+            </a:pPr>
+            <a:r>
+              <a:rPr lang="en-US" altLang="ko-KR" sz="1600" dirty="0" err="1"/>
+              <a:t>Check_In</a:t>
+            </a:r>
+            <a:endParaRPr lang="en-US" altLang="ko-KR" sz="1600" dirty="0"/>
+          </a:p>
+          <a:p>
+            <a:pPr marL="285750" indent="-285750">
+              <a:buFont typeface="Arial" panose="020B0604020202020204" pitchFamily="34" charset="0"/>
+              <a:buChar char="•"/>
+            </a:pPr>
+            <a:r>
+              <a:rPr lang="en-US" altLang="ko-KR" sz="1600" dirty="0" err="1"/>
+              <a:t>Check_Out</a:t>
+            </a:r>
+            <a:endParaRPr lang="en-US" altLang="ko-KR" sz="1600" dirty="0"/>
+          </a:p>
+          <a:p>
+            <a:pPr marL="285750" indent="-285750">
+              <a:buFont typeface="Arial" panose="020B0604020202020204" pitchFamily="34" charset="0"/>
+              <a:buChar char="•"/>
+            </a:pPr>
+            <a:r>
+              <a:rPr lang="en-US" altLang="ko-KR" sz="1600" dirty="0"/>
+              <a:t>List</a:t>
+            </a:r>
+          </a:p>
+          <a:p>
+            <a:pPr marL="285750" indent="-285750">
+              <a:buFont typeface="Arial" panose="020B0604020202020204" pitchFamily="34" charset="0"/>
+              <a:buChar char="•"/>
+            </a:pPr>
+            <a:r>
+              <a:rPr lang="en-US" altLang="ko-KR" sz="1600" dirty="0" err="1"/>
+              <a:t>Updat</a:t>
+            </a:r>
+            <a:endParaRPr lang="en-US" altLang="ko-KR" sz="1600" dirty="0"/>
+          </a:p>
+        </p:txBody>
+      </p:sp>
+      <p:sp>
+        <p:nvSpPr>
+          <p:cNvPr id="5" name="TextBox 4">
+            <a:extLst>
+              <a:ext uri="{FF2B5EF4-FFF2-40B4-BE49-F238E27FC236}">
+                <a16:creationId xmlns:a16="http://schemas.microsoft.com/office/drawing/2014/main" id="{5E896B6E-0963-43E8-B00E-BF65424AB172}"/>
+              </a:ext>
+            </a:extLst>
+          </p:cNvPr>
+          <p:cNvSpPr txBox="1"/>
+          <p:nvPr/>
+        </p:nvSpPr>
+        <p:spPr>
+          <a:xfrm>
+            <a:off x="1228921" y="1466325"/>
+            <a:ext cx="2214389" cy="1015663"/>
+          </a:xfrm>
+          <a:prstGeom prst="rect">
+            <a:avLst/>
+          </a:prstGeom>
+          <a:noFill/>
+        </p:spPr>
+        <p:txBody>
+          <a:bodyPr wrap="none" rtlCol="0">
+            <a:spAutoFit/>
+          </a:bodyPr>
+          <a:lstStyle/>
+          <a:p>
+            <a:r>
+              <a:rPr lang="en-US" altLang="ko-KR" sz="2800" dirty="0"/>
+              <a:t>Guest</a:t>
+            </a:r>
+          </a:p>
+          <a:p>
+            <a:pPr marL="285750" indent="-285750">
+              <a:buFont typeface="Arial" panose="020B0604020202020204" pitchFamily="34" charset="0"/>
+              <a:buChar char="•"/>
+            </a:pPr>
+            <a:r>
+              <a:rPr lang="en-US" altLang="ko-KR" sz="1600" dirty="0" err="1"/>
+              <a:t>Check_in_request</a:t>
+            </a:r>
+            <a:endParaRPr lang="en-US" altLang="ko-KR" sz="1600" dirty="0"/>
+          </a:p>
+          <a:p>
+            <a:pPr marL="285750" indent="-285750">
+              <a:buFont typeface="Arial" panose="020B0604020202020204" pitchFamily="34" charset="0"/>
+              <a:buChar char="•"/>
+            </a:pPr>
+            <a:r>
+              <a:rPr lang="en-US" altLang="ko-KR" sz="1600" dirty="0" err="1"/>
+              <a:t>Check_out_request</a:t>
+            </a:r>
+            <a:endParaRPr lang="en-US" altLang="ko-KR" sz="1600" dirty="0"/>
+          </a:p>
+        </p:txBody>
+      </p:sp>
+      <p:cxnSp>
+        <p:nvCxnSpPr>
+          <p:cNvPr id="7" name="직선 화살표 연결선 6">
+            <a:extLst>
+              <a:ext uri="{FF2B5EF4-FFF2-40B4-BE49-F238E27FC236}">
+                <a16:creationId xmlns:a16="http://schemas.microsoft.com/office/drawing/2014/main" id="{AC07FDE2-34D3-4A71-88B4-14FA2F14BA99}"/>
+              </a:ext>
+            </a:extLst>
+          </p:cNvPr>
+          <p:cNvCxnSpPr>
+            <a:cxnSpLocks/>
+            <a:stCxn id="5" idx="3"/>
+            <a:endCxn id="4" idx="1"/>
+          </p:cNvCxnSpPr>
+          <p:nvPr/>
+        </p:nvCxnSpPr>
+        <p:spPr>
+          <a:xfrm flipV="1">
+            <a:off x="3443310" y="1961892"/>
+            <a:ext cx="2511038" cy="12265"/>
+          </a:xfrm>
+          <a:prstGeom prst="straightConnector1">
+            <a:avLst/>
+          </a:prstGeom>
+          <a:ln>
+            <a:tailEnd type="triangle"/>
+          </a:ln>
+        </p:spPr>
+        <p:style>
+          <a:lnRef idx="1">
+            <a:schemeClr val="accent1"/>
+          </a:lnRef>
+          <a:fillRef idx="0">
+            <a:schemeClr val="accent1"/>
+          </a:fillRef>
+          <a:effectRef idx="0">
+            <a:schemeClr val="accent1"/>
+          </a:effectRef>
+          <a:fontRef idx="minor">
+            <a:schemeClr val="tx1"/>
+          </a:fontRef>
+        </p:style>
+      </p:cxnSp>
+      <p:sp>
+        <p:nvSpPr>
+          <p:cNvPr id="8" name="TextBox 7">
+            <a:extLst>
+              <a:ext uri="{FF2B5EF4-FFF2-40B4-BE49-F238E27FC236}">
+                <a16:creationId xmlns:a16="http://schemas.microsoft.com/office/drawing/2014/main" id="{7B1E0096-1D3C-4966-B30A-0D303A3C745C}"/>
+              </a:ext>
+            </a:extLst>
+          </p:cNvPr>
+          <p:cNvSpPr txBox="1"/>
+          <p:nvPr/>
+        </p:nvSpPr>
+        <p:spPr>
+          <a:xfrm>
+            <a:off x="4247123" y="1767192"/>
+            <a:ext cx="742511" cy="246221"/>
+          </a:xfrm>
+          <a:prstGeom prst="rect">
+            <a:avLst/>
+          </a:prstGeom>
+          <a:noFill/>
+        </p:spPr>
+        <p:txBody>
+          <a:bodyPr wrap="none" rtlCol="0">
+            <a:spAutoFit/>
+          </a:bodyPr>
+          <a:lstStyle/>
+          <a:p>
+            <a:r>
+              <a:rPr lang="ko-KR" altLang="en-US" sz="1000" dirty="0"/>
+              <a:t>정보 전송</a:t>
+            </a:r>
+          </a:p>
+        </p:txBody>
+      </p:sp>
+      <p:sp>
+        <p:nvSpPr>
+          <p:cNvPr id="12" name="TextBox 11">
+            <a:extLst>
+              <a:ext uri="{FF2B5EF4-FFF2-40B4-BE49-F238E27FC236}">
+                <a16:creationId xmlns:a16="http://schemas.microsoft.com/office/drawing/2014/main" id="{CF4F6193-448C-4E7D-BA6F-2530D213803C}"/>
+              </a:ext>
+            </a:extLst>
+          </p:cNvPr>
+          <p:cNvSpPr txBox="1"/>
+          <p:nvPr/>
+        </p:nvSpPr>
+        <p:spPr>
+          <a:xfrm>
+            <a:off x="6670412" y="3686234"/>
+            <a:ext cx="1041439" cy="538609"/>
+          </a:xfrm>
+          <a:prstGeom prst="rect">
+            <a:avLst/>
+          </a:prstGeom>
+          <a:noFill/>
+        </p:spPr>
+        <p:txBody>
+          <a:bodyPr wrap="none" rtlCol="0">
+            <a:spAutoFit/>
+          </a:bodyPr>
+          <a:lstStyle/>
+          <a:p>
+            <a:r>
+              <a:rPr lang="en-US" altLang="ko-KR" dirty="0"/>
+              <a:t>+ Room</a:t>
+            </a:r>
+          </a:p>
+          <a:p>
+            <a:pPr marL="171450" indent="-171450">
+              <a:buFont typeface="Arial" panose="020B0604020202020204" pitchFamily="34" charset="0"/>
+              <a:buChar char="•"/>
+            </a:pPr>
+            <a:r>
+              <a:rPr lang="en-US" altLang="ko-KR" sz="1100" dirty="0"/>
+              <a:t>Info</a:t>
+            </a:r>
+          </a:p>
+        </p:txBody>
+      </p:sp>
+      <p:cxnSp>
+        <p:nvCxnSpPr>
+          <p:cNvPr id="14" name="직선 화살표 연결선 13">
+            <a:extLst>
+              <a:ext uri="{FF2B5EF4-FFF2-40B4-BE49-F238E27FC236}">
+                <a16:creationId xmlns:a16="http://schemas.microsoft.com/office/drawing/2014/main" id="{B85DDA31-CF43-4AD1-9609-26CC72596787}"/>
+              </a:ext>
+            </a:extLst>
+          </p:cNvPr>
+          <p:cNvCxnSpPr>
+            <a:stCxn id="12" idx="1"/>
+            <a:endCxn id="4" idx="2"/>
+          </p:cNvCxnSpPr>
+          <p:nvPr/>
+        </p:nvCxnSpPr>
+        <p:spPr>
+          <a:xfrm flipV="1">
+            <a:off x="6670412" y="2715944"/>
+            <a:ext cx="19073" cy="1239595"/>
+          </a:xfrm>
+          <a:prstGeom prst="straightConnector1">
+            <a:avLst/>
+          </a:prstGeom>
+          <a:ln>
+            <a:tailEnd type="triangle"/>
+          </a:ln>
+        </p:spPr>
+        <p:style>
+          <a:lnRef idx="1">
+            <a:schemeClr val="accent1"/>
+          </a:lnRef>
+          <a:fillRef idx="0">
+            <a:schemeClr val="accent1"/>
+          </a:fillRef>
+          <a:effectRef idx="0">
+            <a:schemeClr val="accent1"/>
+          </a:effectRef>
+          <a:fontRef idx="minor">
+            <a:schemeClr val="tx1"/>
+          </a:fontRef>
+        </p:style>
+      </p:cxnSp>
+      <p:sp>
+        <p:nvSpPr>
+          <p:cNvPr id="16" name="TextBox 15">
+            <a:extLst>
+              <a:ext uri="{FF2B5EF4-FFF2-40B4-BE49-F238E27FC236}">
+                <a16:creationId xmlns:a16="http://schemas.microsoft.com/office/drawing/2014/main" id="{40E71153-4448-4FC3-B470-5C40376CC098}"/>
+              </a:ext>
+            </a:extLst>
+          </p:cNvPr>
+          <p:cNvSpPr txBox="1"/>
+          <p:nvPr/>
+        </p:nvSpPr>
+        <p:spPr>
+          <a:xfrm>
+            <a:off x="1117372" y="4431095"/>
+            <a:ext cx="2811988" cy="877163"/>
+          </a:xfrm>
+          <a:prstGeom prst="rect">
+            <a:avLst/>
+          </a:prstGeom>
+          <a:noFill/>
+        </p:spPr>
+        <p:txBody>
+          <a:bodyPr wrap="none" rtlCol="0">
+            <a:spAutoFit/>
+          </a:bodyPr>
+          <a:lstStyle/>
+          <a:p>
+            <a:r>
+              <a:rPr lang="en-US" altLang="ko-KR" dirty="0"/>
+              <a:t>How request??</a:t>
+            </a:r>
+          </a:p>
+          <a:p>
+            <a:r>
+              <a:rPr lang="en-US" altLang="ko-KR" sz="1100" dirty="0"/>
+              <a:t>&gt;&gt; save to </a:t>
+            </a:r>
+            <a:r>
+              <a:rPr lang="en-US" altLang="ko-KR" sz="1100" dirty="0" err="1"/>
+              <a:t>AdminController.Request_List</a:t>
+            </a:r>
+            <a:endParaRPr lang="en-US" altLang="ko-KR" sz="1100" dirty="0"/>
+          </a:p>
+          <a:p>
+            <a:endParaRPr lang="en-US" altLang="ko-KR" sz="1100" dirty="0"/>
+          </a:p>
+          <a:p>
+            <a:r>
+              <a:rPr lang="en-US" altLang="ko-KR" sz="1100" dirty="0"/>
+              <a:t>&gt;&gt; </a:t>
+            </a:r>
+            <a:r>
+              <a:rPr lang="en-US" altLang="ko-KR" sz="1100" dirty="0" err="1"/>
+              <a:t>websocket</a:t>
+            </a:r>
+            <a:r>
+              <a:rPr lang="en-US" altLang="ko-KR" sz="1100" dirty="0"/>
+              <a:t> make sound</a:t>
+            </a:r>
+            <a:endParaRPr lang="ko-KR" altLang="en-US" sz="1100" dirty="0"/>
+          </a:p>
+        </p:txBody>
+      </p:sp>
+      <p:sp>
+        <p:nvSpPr>
+          <p:cNvPr id="2" name="TextBox 1">
+            <a:extLst>
+              <a:ext uri="{FF2B5EF4-FFF2-40B4-BE49-F238E27FC236}">
+                <a16:creationId xmlns:a16="http://schemas.microsoft.com/office/drawing/2014/main" id="{749FA2F1-276D-4138-9D77-D7A2D2CAEFDA}"/>
+              </a:ext>
+            </a:extLst>
+          </p:cNvPr>
+          <p:cNvSpPr txBox="1"/>
+          <p:nvPr/>
+        </p:nvSpPr>
+        <p:spPr>
+          <a:xfrm>
+            <a:off x="495300" y="495300"/>
+            <a:ext cx="1562094" cy="461665"/>
+          </a:xfrm>
+          <a:prstGeom prst="rect">
+            <a:avLst/>
+          </a:prstGeom>
+          <a:noFill/>
+        </p:spPr>
+        <p:txBody>
+          <a:bodyPr wrap="none" rtlCol="0">
+            <a:spAutoFit/>
+          </a:bodyPr>
+          <a:lstStyle/>
+          <a:p>
+            <a:r>
+              <a:rPr lang="en-US" altLang="ko-KR" sz="2400" dirty="0"/>
+              <a:t>Controller</a:t>
+            </a:r>
+            <a:endParaRPr lang="ko-KR" altLang="en-US" sz="2400" dirty="0"/>
+          </a:p>
+        </p:txBody>
+      </p:sp>
+    </p:spTree>
+    <p:extLst>
+      <p:ext uri="{BB962C8B-B14F-4D97-AF65-F5344CB8AC3E}">
+        <p14:creationId xmlns:p14="http://schemas.microsoft.com/office/powerpoint/2010/main" val="3420516148"/>
+      </p:ext>
+    </p:extLst>
+  </p:cSld>
+  <p:clrMapOvr>
+    <a:masterClrMapping/>
+  </p:clrMapOvr>
+</p:sld>
+</file>
+
+<file path=ppt/slides/slide4.xml><?xml version="1.0" encoding="utf-8"?>
+<p:sld xmlns:a="http://schemas.openxmlformats.org/drawingml/2006/main" xmlns:r="http://schemas.openxmlformats.org/officeDocument/2006/relationships" xmlns:p="http://schemas.openxmlformats.org/presentationml/2006/main">
+  <p:cSld>
+    <p:spTree>
+      <p:nvGrpSpPr>
+        <p:cNvPr id="1" name=""/>
+        <p:cNvGrpSpPr/>
+        <p:nvPr/>
+      </p:nvGrpSpPr>
+      <p:grpSpPr>
+        <a:xfrm>
+          <a:off x="0" y="0"/>
+          <a:ext cx="0" cy="0"/>
+          <a:chOff x="0" y="0"/>
+          <a:chExt cx="0" cy="0"/>
+        </a:xfrm>
+      </p:grpSpPr>
+      <p:sp>
+        <p:nvSpPr>
+          <p:cNvPr id="3" name="TextBox 2">
+            <a:extLst>
+              <a:ext uri="{FF2B5EF4-FFF2-40B4-BE49-F238E27FC236}">
+                <a16:creationId xmlns:a16="http://schemas.microsoft.com/office/drawing/2014/main" id="{C0BD2C7A-D07F-4C10-B16B-B4A7881FDCE4}"/>
+              </a:ext>
+            </a:extLst>
+          </p:cNvPr>
+          <p:cNvSpPr txBox="1"/>
+          <p:nvPr/>
+        </p:nvSpPr>
+        <p:spPr>
+          <a:xfrm>
+            <a:off x="558800" y="508000"/>
+            <a:ext cx="4138121" cy="461665"/>
+          </a:xfrm>
+          <a:prstGeom prst="rect">
+            <a:avLst/>
+          </a:prstGeom>
+          <a:noFill/>
+        </p:spPr>
+        <p:txBody>
+          <a:bodyPr wrap="none" rtlCol="0">
+            <a:spAutoFit/>
+          </a:bodyPr>
+          <a:lstStyle/>
+          <a:p>
+            <a:r>
+              <a:rPr lang="en-US" altLang="ko-KR" sz="2400" dirty="0"/>
+              <a:t>Admin Controller Json Code</a:t>
+            </a:r>
+            <a:endParaRPr lang="ko-KR" altLang="en-US" sz="2400" dirty="0"/>
+          </a:p>
+        </p:txBody>
+      </p:sp>
+      <p:sp>
+        <p:nvSpPr>
+          <p:cNvPr id="4" name="TextBox 3">
+            <a:extLst>
+              <a:ext uri="{FF2B5EF4-FFF2-40B4-BE49-F238E27FC236}">
+                <a16:creationId xmlns:a16="http://schemas.microsoft.com/office/drawing/2014/main" id="{6FD70171-EA91-41AE-A6C0-4CA92FFA4F35}"/>
+              </a:ext>
+            </a:extLst>
+          </p:cNvPr>
+          <p:cNvSpPr txBox="1"/>
+          <p:nvPr/>
+        </p:nvSpPr>
+        <p:spPr>
+          <a:xfrm>
+            <a:off x="914400" y="1117600"/>
+            <a:ext cx="3791423" cy="3693319"/>
+          </a:xfrm>
+          <a:prstGeom prst="rect">
+            <a:avLst/>
+          </a:prstGeom>
+          <a:noFill/>
+        </p:spPr>
+        <p:txBody>
+          <a:bodyPr wrap="none" rtlCol="0">
+            <a:spAutoFit/>
+          </a:bodyPr>
+          <a:lstStyle/>
+          <a:p>
+            <a:r>
+              <a:rPr lang="en-US" altLang="ko-KR" dirty="0"/>
+              <a:t>{ </a:t>
+            </a:r>
+          </a:p>
+          <a:p>
+            <a:r>
+              <a:rPr lang="en-US" altLang="ko-KR" dirty="0"/>
+              <a:t>  "room" : "202",</a:t>
+            </a:r>
+          </a:p>
+          <a:p>
+            <a:r>
+              <a:rPr lang="en-US" altLang="ko-KR" dirty="0"/>
+              <a:t>  "email" : "admin@exmaple.com",</a:t>
+            </a:r>
+          </a:p>
+          <a:p>
+            <a:r>
+              <a:rPr lang="en-US" altLang="ko-KR" dirty="0"/>
+              <a:t>  "name": "123123123123213",</a:t>
+            </a:r>
+          </a:p>
+          <a:p>
+            <a:r>
+              <a:rPr lang="en-US" altLang="ko-KR" dirty="0"/>
+              <a:t>  "</a:t>
+            </a:r>
+            <a:r>
+              <a:rPr lang="en-US" altLang="ko-KR" dirty="0" err="1"/>
+              <a:t>phonenum</a:t>
+            </a:r>
+            <a:r>
+              <a:rPr lang="en-US" altLang="ko-KR" dirty="0"/>
+              <a:t>": "010-1234-5678",</a:t>
+            </a:r>
+          </a:p>
+          <a:p>
+            <a:r>
+              <a:rPr lang="en-US" altLang="ko-KR" dirty="0"/>
+              <a:t>  "</a:t>
+            </a:r>
+            <a:r>
+              <a:rPr lang="en-US" altLang="ko-KR" dirty="0" err="1"/>
+              <a:t>roomInfo</a:t>
+            </a:r>
+            <a:r>
+              <a:rPr lang="en-US" altLang="ko-KR" dirty="0"/>
+              <a:t>" :</a:t>
+            </a:r>
+          </a:p>
+          <a:p>
+            <a:r>
+              <a:rPr lang="en-US" altLang="ko-KR" dirty="0"/>
+              <a:t>    {</a:t>
+            </a:r>
+          </a:p>
+          <a:p>
+            <a:r>
+              <a:rPr lang="en-US" altLang="ko-KR" dirty="0"/>
+              <a:t>  "</a:t>
+            </a:r>
+            <a:r>
+              <a:rPr lang="en-US" altLang="ko-KR" dirty="0" err="1"/>
+              <a:t>roomnum</a:t>
+            </a:r>
+            <a:r>
+              <a:rPr lang="en-US" altLang="ko-KR" dirty="0"/>
+              <a:t>" : "202",</a:t>
+            </a:r>
+          </a:p>
+          <a:p>
+            <a:r>
+              <a:rPr lang="en-US" altLang="ko-KR" dirty="0"/>
+              <a:t>    "</a:t>
+            </a:r>
+            <a:r>
+              <a:rPr lang="en-US" altLang="ko-KR" dirty="0" err="1"/>
+              <a:t>bedtype</a:t>
+            </a:r>
+            <a:r>
+              <a:rPr lang="en-US" altLang="ko-KR" dirty="0"/>
+              <a:t>" : "twin",</a:t>
+            </a:r>
+          </a:p>
+          <a:p>
+            <a:r>
+              <a:rPr lang="en-US" altLang="ko-KR" dirty="0"/>
+              <a:t>    "people" : "10",</a:t>
+            </a:r>
+          </a:p>
+          <a:p>
+            <a:r>
+              <a:rPr lang="en-US" altLang="ko-KR" dirty="0"/>
+              <a:t>    "</a:t>
+            </a:r>
+            <a:r>
+              <a:rPr lang="en-US" altLang="ko-KR" dirty="0" err="1"/>
+              <a:t>st</a:t>
+            </a:r>
+            <a:r>
+              <a:rPr lang="en-US" altLang="ko-KR" dirty="0"/>
+              <a:t>" : "using"</a:t>
+            </a:r>
+          </a:p>
+          <a:p>
+            <a:r>
+              <a:rPr lang="en-US" altLang="ko-KR" dirty="0"/>
+              <a:t>    } </a:t>
+            </a:r>
+          </a:p>
+          <a:p>
+            <a:r>
+              <a:rPr lang="en-US" altLang="ko-KR" dirty="0"/>
+              <a:t>}</a:t>
+            </a:r>
+            <a:endParaRPr lang="ko-KR" altLang="en-US" dirty="0"/>
+          </a:p>
+        </p:txBody>
+      </p:sp>
     </p:spTree>
     <p:extLst>
       <p:ext uri="{BB962C8B-B14F-4D97-AF65-F5344CB8AC3E}">
         <p14:creationId xmlns:p14="http://schemas.microsoft.com/office/powerpoint/2010/main" val="3509901226"/>
+      </p:ext>
+    </p:extLst>
+  </p:cSld>
+  <p:clrMapOvr>
+    <a:masterClrMapping/>
+  </p:clrMapOvr>
+</p:sld>
+</file>
+
+<file path=ppt/slides/slide5.xml><?xml version="1.0" encoding="utf-8"?>
+<p:sld xmlns:a="http://schemas.openxmlformats.org/drawingml/2006/main" xmlns:r="http://schemas.openxmlformats.org/officeDocument/2006/relationships" xmlns:p="http://schemas.openxmlformats.org/presentationml/2006/main">
+  <p:cSld>
+    <p:spTree>
+      <p:nvGrpSpPr>
+        <p:cNvPr id="1" name=""/>
+        <p:cNvGrpSpPr/>
+        <p:nvPr/>
+      </p:nvGrpSpPr>
+      <p:grpSpPr>
+        <a:xfrm>
+          <a:off x="0" y="0"/>
+          <a:ext cx="0" cy="0"/>
+          <a:chOff x="0" y="0"/>
+          <a:chExt cx="0" cy="0"/>
+        </a:xfrm>
+      </p:grpSpPr>
+      <p:sp>
+        <p:nvSpPr>
+          <p:cNvPr id="4" name="TextBox 3">
+            <a:extLst>
+              <a:ext uri="{FF2B5EF4-FFF2-40B4-BE49-F238E27FC236}">
+                <a16:creationId xmlns:a16="http://schemas.microsoft.com/office/drawing/2014/main" id="{16E8FFEA-CDF8-4EAA-8703-0FA1CE9A7A66}"/>
+              </a:ext>
+            </a:extLst>
+          </p:cNvPr>
+          <p:cNvSpPr txBox="1"/>
+          <p:nvPr/>
+        </p:nvSpPr>
+        <p:spPr>
+          <a:xfrm>
+            <a:off x="558800" y="508000"/>
+            <a:ext cx="4024307" cy="461665"/>
+          </a:xfrm>
+          <a:prstGeom prst="rect">
+            <a:avLst/>
+          </a:prstGeom>
+          <a:noFill/>
+        </p:spPr>
+        <p:txBody>
+          <a:bodyPr wrap="none" rtlCol="0">
+            <a:spAutoFit/>
+          </a:bodyPr>
+          <a:lstStyle/>
+          <a:p>
+            <a:r>
+              <a:rPr lang="en-US" altLang="ko-KR" sz="2400" dirty="0"/>
+              <a:t>Guest Controller Json Code</a:t>
+            </a:r>
+            <a:endParaRPr lang="ko-KR" altLang="en-US" sz="2400" dirty="0"/>
+          </a:p>
+        </p:txBody>
+      </p:sp>
+      <p:sp>
+        <p:nvSpPr>
+          <p:cNvPr id="5" name="TextBox 4">
+            <a:extLst>
+              <a:ext uri="{FF2B5EF4-FFF2-40B4-BE49-F238E27FC236}">
+                <a16:creationId xmlns:a16="http://schemas.microsoft.com/office/drawing/2014/main" id="{31F31293-8DC4-4E28-A62E-B6792CCE4D39}"/>
+              </a:ext>
+            </a:extLst>
+          </p:cNvPr>
+          <p:cNvSpPr txBox="1"/>
+          <p:nvPr/>
+        </p:nvSpPr>
+        <p:spPr>
+          <a:xfrm>
+            <a:off x="736600" y="1308100"/>
+            <a:ext cx="3791423" cy="1477328"/>
+          </a:xfrm>
+          <a:prstGeom prst="rect">
+            <a:avLst/>
+          </a:prstGeom>
+          <a:noFill/>
+        </p:spPr>
+        <p:txBody>
+          <a:bodyPr wrap="none" rtlCol="0">
+            <a:spAutoFit/>
+          </a:bodyPr>
+          <a:lstStyle/>
+          <a:p>
+            <a:r>
+              <a:rPr lang="en-US" altLang="ko-KR" dirty="0"/>
+              <a:t>{ </a:t>
+            </a:r>
+          </a:p>
+          <a:p>
+            <a:r>
+              <a:rPr lang="en-US" altLang="ko-KR" dirty="0"/>
+              <a:t>  "email" : "admin@exmaple.com",</a:t>
+            </a:r>
+          </a:p>
+          <a:p>
+            <a:r>
+              <a:rPr lang="en-US" altLang="ko-KR" dirty="0"/>
+              <a:t>  "name": "123123123123213",</a:t>
+            </a:r>
+          </a:p>
+          <a:p>
+            <a:r>
+              <a:rPr lang="en-US" altLang="ko-KR" dirty="0"/>
+              <a:t>  "</a:t>
+            </a:r>
+            <a:r>
+              <a:rPr lang="en-US" altLang="ko-KR" dirty="0" err="1"/>
+              <a:t>phonenum</a:t>
+            </a:r>
+            <a:r>
+              <a:rPr lang="en-US" altLang="ko-KR" dirty="0"/>
+              <a:t>": "010-1234-5678"</a:t>
+            </a:r>
+          </a:p>
+          <a:p>
+            <a:r>
+              <a:rPr lang="en-US" altLang="ko-KR" dirty="0"/>
+              <a:t>}</a:t>
+            </a:r>
+            <a:endParaRPr lang="ko-KR" altLang="en-US" dirty="0"/>
+          </a:p>
+        </p:txBody>
+      </p:sp>
+      <p:sp>
+        <p:nvSpPr>
+          <p:cNvPr id="6" name="TextBox 5">
+            <a:extLst>
+              <a:ext uri="{FF2B5EF4-FFF2-40B4-BE49-F238E27FC236}">
+                <a16:creationId xmlns:a16="http://schemas.microsoft.com/office/drawing/2014/main" id="{CFA27BD4-CC43-4CC7-ABF8-0712BE121DA9}"/>
+              </a:ext>
+            </a:extLst>
+          </p:cNvPr>
+          <p:cNvSpPr txBox="1"/>
+          <p:nvPr/>
+        </p:nvSpPr>
+        <p:spPr>
+          <a:xfrm>
+            <a:off x="5829300" y="1917700"/>
+            <a:ext cx="4097147" cy="369332"/>
+          </a:xfrm>
+          <a:prstGeom prst="rect">
+            <a:avLst/>
+          </a:prstGeom>
+          <a:noFill/>
+        </p:spPr>
+        <p:txBody>
+          <a:bodyPr wrap="none" rtlCol="0">
+            <a:spAutoFit/>
+          </a:bodyPr>
+          <a:lstStyle/>
+          <a:p>
+            <a:r>
+              <a:rPr lang="en-US" altLang="ko-KR" dirty="0"/>
+              <a:t>//TODO : </a:t>
+            </a:r>
+            <a:r>
+              <a:rPr lang="en-US" altLang="ko-KR" dirty="0" err="1"/>
+              <a:t>AdminRepository</a:t>
+            </a:r>
+            <a:r>
+              <a:rPr lang="en-US" altLang="ko-KR" dirty="0"/>
+              <a:t> </a:t>
+            </a:r>
+            <a:r>
+              <a:rPr lang="ko-KR" altLang="en-US" dirty="0"/>
+              <a:t>에 넘기기</a:t>
+            </a:r>
+          </a:p>
+        </p:txBody>
+      </p:sp>
+    </p:spTree>
+    <p:extLst>
+      <p:ext uri="{BB962C8B-B14F-4D97-AF65-F5344CB8AC3E}">
+        <p14:creationId xmlns:p14="http://schemas.microsoft.com/office/powerpoint/2010/main" val="3037556569"/>
       </p:ext>
     </p:extLst>
   </p:cSld>

</xml_diff>

<commit_message>
/TODO: construct Sse service
</commit_message>
<xml_diff>
--- a/admin.pptx
+++ b/admin.pptx
@@ -3985,6 +3985,41 @@
           </a:p>
         </p:txBody>
       </p:sp>
+      <p:sp>
+        <p:nvSpPr>
+          <p:cNvPr id="3" name="TextBox 2">
+            <a:extLst>
+              <a:ext uri="{FF2B5EF4-FFF2-40B4-BE49-F238E27FC236}">
+                <a16:creationId xmlns:a16="http://schemas.microsoft.com/office/drawing/2014/main" id="{3424C780-DE9A-4D6D-BF1A-1963DD2A0F2C}"/>
+              </a:ext>
+            </a:extLst>
+          </p:cNvPr>
+          <p:cNvSpPr txBox="1"/>
+          <p:nvPr/>
+        </p:nvSpPr>
+        <p:spPr>
+          <a:xfrm>
+            <a:off x="8750300" y="838200"/>
+            <a:ext cx="1189749" cy="369332"/>
+          </a:xfrm>
+          <a:prstGeom prst="rect">
+            <a:avLst/>
+          </a:prstGeom>
+          <a:noFill/>
+        </p:spPr>
+        <p:txBody>
+          <a:bodyPr wrap="none" rtlCol="0">
+            <a:spAutoFit/>
+          </a:bodyPr>
+          <a:lstStyle/>
+          <a:p>
+            <a:r>
+              <a:rPr lang="ko-KR" altLang="en-US" dirty="0"/>
+              <a:t>기간 추가</a:t>
+            </a:r>
+          </a:p>
+        </p:txBody>
+      </p:sp>
     </p:spTree>
     <p:extLst>
       <p:ext uri="{BB962C8B-B14F-4D97-AF65-F5344CB8AC3E}">

</xml_diff>